<commit_message>
updating edits during demo
</commit_message>
<xml_diff>
--- a/CSCI795_FA20_Presentation_Paing_Washburn.pptx
+++ b/CSCI795_FA20_Presentation_Paing_Washburn.pptx
@@ -5,7 +5,7 @@
     <p:sldMasterId id="2147483648" r:id="rId1"/>
   </p:sldMasterIdLst>
   <p:notesMasterIdLst>
-    <p:notesMasterId r:id="rId14"/>
+    <p:notesMasterId r:id="rId15"/>
   </p:notesMasterIdLst>
   <p:sldIdLst>
     <p:sldId id="256" r:id="rId2"/>
@@ -20,6 +20,7 @@
     <p:sldId id="266" r:id="rId11"/>
     <p:sldId id="268" r:id="rId12"/>
     <p:sldId id="265" r:id="rId13"/>
+    <p:sldId id="269" r:id="rId14"/>
   </p:sldIdLst>
   <p:sldSz cx="12192000" cy="6858000"/>
   <p:notesSz cx="7772400" cy="10058400"/>
@@ -118,6 +119,11 @@
       </a:defRPr>
     </a:lvl9pPr>
   </p:defaultTextStyle>
+  <p:extLst>
+    <p:ext uri="{EFAFB233-063F-42B5-8137-9DF3F51BA10A}">
+      <p15:sldGuideLst xmlns:p15="http://schemas.microsoft.com/office/powerpoint/2012/main"/>
+    </p:ext>
+  </p:extLst>
 </p:presentation>
 </file>
 
@@ -203,7 +209,7 @@
           <a:p>
             <a:fld id="{696893A0-4D49-D74E-B6A0-CDDE34D869CC}" type="datetimeFigureOut">
               <a:rPr lang="en-US" smtClean="0"/>
-              <a:t>11/22/20</a:t>
+              <a:t>11/24/20</a:t>
             </a:fld>
             <a:endParaRPr lang="en-US"/>
           </a:p>
@@ -535,6 +541,174 @@
           <a:p>
             <a:fld id="{09417B1D-7CC8-7842-95E7-711968958A52}" type="slidenum">
               <a:rPr lang="en-US" smtClean="0"/>
+              <a:t>1</a:t>
+            </a:fld>
+            <a:endParaRPr lang="en-US"/>
+          </a:p>
+        </p:txBody>
+      </p:sp>
+    </p:spTree>
+    <p:extLst>
+      <p:ext uri="{BB962C8B-B14F-4D97-AF65-F5344CB8AC3E}">
+        <p14:creationId xmlns:p14="http://schemas.microsoft.com/office/powerpoint/2010/main" val="945659808"/>
+      </p:ext>
+    </p:extLst>
+  </p:cSld>
+  <p:clrMapOvr>
+    <a:masterClrMapping/>
+  </p:clrMapOvr>
+</p:notes>
+</file>
+
+<file path=ppt/notesSlides/notesSlide2.xml><?xml version="1.0" encoding="utf-8"?>
+<p:notes xmlns:a="http://schemas.openxmlformats.org/drawingml/2006/main" xmlns:r="http://schemas.openxmlformats.org/officeDocument/2006/relationships" xmlns:p="http://schemas.openxmlformats.org/presentationml/2006/main">
+  <p:cSld>
+    <p:spTree>
+      <p:nvGrpSpPr>
+        <p:cNvPr id="1" name=""/>
+        <p:cNvGrpSpPr/>
+        <p:nvPr/>
+      </p:nvGrpSpPr>
+      <p:grpSpPr>
+        <a:xfrm>
+          <a:off x="0" y="0"/>
+          <a:ext cx="0" cy="0"/>
+          <a:chOff x="0" y="0"/>
+          <a:chExt cx="0" cy="0"/>
+        </a:xfrm>
+      </p:grpSpPr>
+      <p:sp>
+        <p:nvSpPr>
+          <p:cNvPr id="2" name="Slide Image Placeholder 1"/>
+          <p:cNvSpPr>
+            <a:spLocks noGrp="1" noRot="1" noChangeAspect="1"/>
+          </p:cNvSpPr>
+          <p:nvPr>
+            <p:ph type="sldImg"/>
+          </p:nvPr>
+        </p:nvSpPr>
+        <p:spPr/>
+      </p:sp>
+      <p:sp>
+        <p:nvSpPr>
+          <p:cNvPr id="3" name="Notes Placeholder 2"/>
+          <p:cNvSpPr>
+            <a:spLocks noGrp="1"/>
+          </p:cNvSpPr>
+          <p:nvPr>
+            <p:ph type="body" idx="1"/>
+          </p:nvPr>
+        </p:nvSpPr>
+        <p:spPr/>
+        <p:txBody>
+          <a:bodyPr/>
+          <a:lstStyle/>
+          <a:p>
+            <a:endParaRPr lang="en-US" dirty="0"/>
+          </a:p>
+        </p:txBody>
+      </p:sp>
+      <p:sp>
+        <p:nvSpPr>
+          <p:cNvPr id="4" name="Slide Number Placeholder 3"/>
+          <p:cNvSpPr>
+            <a:spLocks noGrp="1"/>
+          </p:cNvSpPr>
+          <p:nvPr>
+            <p:ph type="sldNum" sz="quarter" idx="5"/>
+          </p:nvPr>
+        </p:nvSpPr>
+        <p:spPr/>
+        <p:txBody>
+          <a:bodyPr/>
+          <a:lstStyle/>
+          <a:p>
+            <a:fld id="{09417B1D-7CC8-7842-95E7-711968958A52}" type="slidenum">
+              <a:rPr lang="en-US" smtClean="0"/>
+              <a:t>2</a:t>
+            </a:fld>
+            <a:endParaRPr lang="en-US"/>
+          </a:p>
+        </p:txBody>
+      </p:sp>
+    </p:spTree>
+    <p:extLst>
+      <p:ext uri="{BB962C8B-B14F-4D97-AF65-F5344CB8AC3E}">
+        <p14:creationId xmlns:p14="http://schemas.microsoft.com/office/powerpoint/2010/main" val="2898967759"/>
+      </p:ext>
+    </p:extLst>
+  </p:cSld>
+  <p:clrMapOvr>
+    <a:masterClrMapping/>
+  </p:clrMapOvr>
+</p:notes>
+</file>
+
+<file path=ppt/notesSlides/notesSlide3.xml><?xml version="1.0" encoding="utf-8"?>
+<p:notes xmlns:a="http://schemas.openxmlformats.org/drawingml/2006/main" xmlns:r="http://schemas.openxmlformats.org/officeDocument/2006/relationships" xmlns:p="http://schemas.openxmlformats.org/presentationml/2006/main">
+  <p:cSld>
+    <p:spTree>
+      <p:nvGrpSpPr>
+        <p:cNvPr id="1" name=""/>
+        <p:cNvGrpSpPr/>
+        <p:nvPr/>
+      </p:nvGrpSpPr>
+      <p:grpSpPr>
+        <a:xfrm>
+          <a:off x="0" y="0"/>
+          <a:ext cx="0" cy="0"/>
+          <a:chOff x="0" y="0"/>
+          <a:chExt cx="0" cy="0"/>
+        </a:xfrm>
+      </p:grpSpPr>
+      <p:sp>
+        <p:nvSpPr>
+          <p:cNvPr id="2" name="Slide Image Placeholder 1"/>
+          <p:cNvSpPr>
+            <a:spLocks noGrp="1" noRot="1" noChangeAspect="1"/>
+          </p:cNvSpPr>
+          <p:nvPr>
+            <p:ph type="sldImg"/>
+          </p:nvPr>
+        </p:nvSpPr>
+        <p:spPr/>
+      </p:sp>
+      <p:sp>
+        <p:nvSpPr>
+          <p:cNvPr id="3" name="Notes Placeholder 2"/>
+          <p:cNvSpPr>
+            <a:spLocks noGrp="1"/>
+          </p:cNvSpPr>
+          <p:nvPr>
+            <p:ph type="body" idx="1"/>
+          </p:nvPr>
+        </p:nvSpPr>
+        <p:spPr/>
+        <p:txBody>
+          <a:bodyPr/>
+          <a:lstStyle/>
+          <a:p>
+            <a:endParaRPr lang="en-US" dirty="0"/>
+          </a:p>
+        </p:txBody>
+      </p:sp>
+      <p:sp>
+        <p:nvSpPr>
+          <p:cNvPr id="4" name="Slide Number Placeholder 3"/>
+          <p:cNvSpPr>
+            <a:spLocks noGrp="1"/>
+          </p:cNvSpPr>
+          <p:nvPr>
+            <p:ph type="sldNum" sz="quarter" idx="5"/>
+          </p:nvPr>
+        </p:nvSpPr>
+        <p:spPr/>
+        <p:txBody>
+          <a:bodyPr/>
+          <a:lstStyle/>
+          <a:p>
+            <a:fld id="{09417B1D-7CC8-7842-95E7-711968958A52}" type="slidenum">
+              <a:rPr lang="en-US" smtClean="0"/>
               <a:t>5</a:t>
             </a:fld>
             <a:endParaRPr lang="en-US"/>
@@ -2184,7 +2358,7 @@
                 </a:solidFill>
                 <a:latin typeface="Calibri"/>
               </a:rPr>
-              <a:t>11/22/20</a:t>
+              <a:t>11/24/20</a:t>
             </a:fld>
             <a:endParaRPr lang="en-US" sz="1200" b="0" strike="noStrike" spc="-1">
               <a:latin typeface="Times New Roman"/>
@@ -2751,6 +2925,40 @@
 <file path=ppt/slides/slide1.xml><?xml version="1.0" encoding="utf-8"?>
 <p:sld xmlns:a="http://schemas.openxmlformats.org/drawingml/2006/main" xmlns:r="http://schemas.openxmlformats.org/officeDocument/2006/relationships" xmlns:p="http://schemas.openxmlformats.org/presentationml/2006/main">
   <p:cSld>
+    <p:bg>
+      <p:bgPr>
+        <a:gradFill>
+          <a:gsLst>
+            <a:gs pos="24000">
+              <a:schemeClr val="accent1">
+                <a:lumMod val="5000"/>
+                <a:lumOff val="95000"/>
+              </a:schemeClr>
+            </a:gs>
+            <a:gs pos="72000">
+              <a:schemeClr val="accent1">
+                <a:lumMod val="45000"/>
+                <a:lumOff val="55000"/>
+              </a:schemeClr>
+            </a:gs>
+            <a:gs pos="83000">
+              <a:schemeClr val="accent1">
+                <a:lumMod val="45000"/>
+                <a:lumOff val="55000"/>
+              </a:schemeClr>
+            </a:gs>
+            <a:gs pos="100000">
+              <a:schemeClr val="accent1">
+                <a:lumMod val="30000"/>
+                <a:lumOff val="70000"/>
+              </a:schemeClr>
+            </a:gs>
+          </a:gsLst>
+          <a:lin ang="5400000" scaled="1"/>
+        </a:gradFill>
+        <a:effectLst/>
+      </p:bgPr>
+    </p:bg>
     <p:spTree>
       <p:nvGrpSpPr>
         <p:cNvPr id="1" name=""/>
@@ -2952,6 +3160,40 @@
 <file path=ppt/slides/slide10.xml><?xml version="1.0" encoding="utf-8"?>
 <p:sld xmlns:a="http://schemas.openxmlformats.org/drawingml/2006/main" xmlns:r="http://schemas.openxmlformats.org/officeDocument/2006/relationships" xmlns:p="http://schemas.openxmlformats.org/presentationml/2006/main">
   <p:cSld>
+    <p:bg>
+      <p:bgPr>
+        <a:gradFill>
+          <a:gsLst>
+            <a:gs pos="24000">
+              <a:schemeClr val="accent1">
+                <a:lumMod val="5000"/>
+                <a:lumOff val="95000"/>
+              </a:schemeClr>
+            </a:gs>
+            <a:gs pos="72000">
+              <a:schemeClr val="accent1">
+                <a:lumMod val="45000"/>
+                <a:lumOff val="55000"/>
+              </a:schemeClr>
+            </a:gs>
+            <a:gs pos="83000">
+              <a:schemeClr val="accent1">
+                <a:lumMod val="45000"/>
+                <a:lumOff val="55000"/>
+              </a:schemeClr>
+            </a:gs>
+            <a:gs pos="100000">
+              <a:schemeClr val="accent1">
+                <a:lumMod val="30000"/>
+                <a:lumOff val="70000"/>
+              </a:schemeClr>
+            </a:gs>
+          </a:gsLst>
+          <a:lin ang="5400000" scaled="1"/>
+        </a:gradFill>
+        <a:effectLst/>
+      </p:bgPr>
+    </p:bg>
     <p:spTree>
       <p:nvGrpSpPr>
         <p:cNvPr id="1" name=""/>
@@ -3139,6 +3381,40 @@
 <file path=ppt/slides/slide11.xml><?xml version="1.0" encoding="utf-8"?>
 <p:sld xmlns:a="http://schemas.openxmlformats.org/drawingml/2006/main" xmlns:r="http://schemas.openxmlformats.org/officeDocument/2006/relationships" xmlns:p="http://schemas.openxmlformats.org/presentationml/2006/main">
   <p:cSld>
+    <p:bg>
+      <p:bgPr>
+        <a:gradFill>
+          <a:gsLst>
+            <a:gs pos="24000">
+              <a:schemeClr val="accent1">
+                <a:lumMod val="5000"/>
+                <a:lumOff val="95000"/>
+              </a:schemeClr>
+            </a:gs>
+            <a:gs pos="72000">
+              <a:schemeClr val="accent1">
+                <a:lumMod val="45000"/>
+                <a:lumOff val="55000"/>
+              </a:schemeClr>
+            </a:gs>
+            <a:gs pos="83000">
+              <a:schemeClr val="accent1">
+                <a:lumMod val="45000"/>
+                <a:lumOff val="55000"/>
+              </a:schemeClr>
+            </a:gs>
+            <a:gs pos="100000">
+              <a:schemeClr val="accent1">
+                <a:lumMod val="30000"/>
+                <a:lumOff val="70000"/>
+              </a:schemeClr>
+            </a:gs>
+          </a:gsLst>
+          <a:lin ang="5400000" scaled="1"/>
+        </a:gradFill>
+        <a:effectLst/>
+      </p:bgPr>
+    </p:bg>
     <p:spTree>
       <p:nvGrpSpPr>
         <p:cNvPr id="1" name=""/>
@@ -3291,6 +3567,40 @@
 <file path=ppt/slides/slide12.xml><?xml version="1.0" encoding="utf-8"?>
 <p:sld xmlns:a="http://schemas.openxmlformats.org/drawingml/2006/main" xmlns:r="http://schemas.openxmlformats.org/officeDocument/2006/relationships" xmlns:p="http://schemas.openxmlformats.org/presentationml/2006/main">
   <p:cSld>
+    <p:bg>
+      <p:bgPr>
+        <a:gradFill>
+          <a:gsLst>
+            <a:gs pos="24000">
+              <a:schemeClr val="accent1">
+                <a:lumMod val="5000"/>
+                <a:lumOff val="95000"/>
+              </a:schemeClr>
+            </a:gs>
+            <a:gs pos="72000">
+              <a:schemeClr val="accent1">
+                <a:lumMod val="45000"/>
+                <a:lumOff val="55000"/>
+              </a:schemeClr>
+            </a:gs>
+            <a:gs pos="83000">
+              <a:schemeClr val="accent1">
+                <a:lumMod val="45000"/>
+                <a:lumOff val="55000"/>
+              </a:schemeClr>
+            </a:gs>
+            <a:gs pos="100000">
+              <a:schemeClr val="accent1">
+                <a:lumMod val="30000"/>
+                <a:lumOff val="70000"/>
+              </a:schemeClr>
+            </a:gs>
+          </a:gsLst>
+          <a:lin ang="5400000" scaled="1"/>
+        </a:gradFill>
+        <a:effectLst/>
+      </p:bgPr>
+    </p:bg>
     <p:spTree>
       <p:nvGrpSpPr>
         <p:cNvPr id="1" name=""/>
@@ -3384,7 +3694,7 @@
 </p:sld>
 </file>
 
-<file path=ppt/slides/slide2.xml><?xml version="1.0" encoding="utf-8"?>
+<file path=ppt/slides/slide13.xml><?xml version="1.0" encoding="utf-8"?>
 <p:sld xmlns:a="http://schemas.openxmlformats.org/drawingml/2006/main" xmlns:r="http://schemas.openxmlformats.org/officeDocument/2006/relationships" xmlns:p="http://schemas.openxmlformats.org/presentationml/2006/main">
   <p:cSld>
     <p:spTree>
@@ -3403,216 +3713,44 @@
       </p:grpSpPr>
       <p:sp>
         <p:nvSpPr>
-          <p:cNvPr id="43" name="TextShape 1"/>
-          <p:cNvSpPr txBox="1"/>
-          <p:nvPr/>
-        </p:nvSpPr>
-        <p:spPr>
-          <a:xfrm>
-            <a:off x="1523880" y="299520"/>
-            <a:ext cx="9143640" cy="980640"/>
-          </a:xfrm>
-          <a:prstGeom prst="rect">
-            <a:avLst/>
-          </a:prstGeom>
-          <a:noFill/>
-          <a:ln>
-            <a:noFill/>
-          </a:ln>
-        </p:spPr>
-        <p:txBody>
-          <a:bodyPr anchor="b">
-            <a:noAutofit/>
-          </a:bodyPr>
-          <a:lstStyle/>
-          <a:p>
-            <a:pPr algn="ctr">
-              <a:lnSpc>
-                <a:spcPct val="90000"/>
-              </a:lnSpc>
-            </a:pPr>
-            <a:r>
-              <a:rPr lang="en-US" sz="4800" b="0" strike="noStrike" spc="-1">
-                <a:solidFill>
-                  <a:srgbClr val="000000"/>
-                </a:solidFill>
-                <a:latin typeface="Calibri Light"/>
-              </a:rPr>
-              <a:t>What makes an actor</a:t>
-            </a:r>
-            <a:endParaRPr lang="en-US" sz="4800" b="0" strike="noStrike" spc="-1">
-              <a:solidFill>
-                <a:srgbClr val="000000"/>
-              </a:solidFill>
-              <a:latin typeface="Calibri"/>
-            </a:endParaRPr>
-          </a:p>
-        </p:txBody>
-      </p:sp>
-      <p:sp>
-        <p:nvSpPr>
-          <p:cNvPr id="44" name="TextShape 2"/>
-          <p:cNvSpPr txBox="1"/>
-          <p:nvPr/>
-        </p:nvSpPr>
-        <p:spPr>
-          <a:xfrm>
-            <a:off x="1554480" y="2228760"/>
-            <a:ext cx="9267840" cy="2617560"/>
-          </a:xfrm>
-          <a:prstGeom prst="rect">
-            <a:avLst/>
-          </a:prstGeom>
-          <a:noFill/>
-          <a:ln>
-            <a:noFill/>
-          </a:ln>
-        </p:spPr>
-        <p:txBody>
-          <a:bodyPr>
-            <a:normAutofit/>
-          </a:bodyPr>
-          <a:lstStyle/>
-          <a:p>
-            <a:pPr marL="216000" indent="-216000">
-              <a:lnSpc>
-                <a:spcPct val="90000"/>
-              </a:lnSpc>
-              <a:spcBef>
-                <a:spcPts val="1001"/>
-              </a:spcBef>
-              <a:buClr>
-                <a:srgbClr val="000000"/>
-              </a:buClr>
-              <a:buSzPct val="45000"/>
-              <a:buFont typeface="Wingdings" charset="2"/>
-              <a:buChar char=""/>
-              <a:tabLst>
-                <a:tab pos="0" algn="l"/>
-              </a:tabLst>
-            </a:pPr>
-            <a:r>
-              <a:rPr lang="en-US" sz="2400" b="0" strike="noStrike" spc="-1">
-                <a:solidFill>
-                  <a:srgbClr val="000000"/>
-                </a:solidFill>
-                <a:latin typeface="Calibri"/>
-              </a:rPr>
-              <a:t>It has a unique identity</a:t>
-            </a:r>
-            <a:endParaRPr lang="en-US" sz="2400" b="0" strike="noStrike" spc="-1">
-              <a:latin typeface="Arial"/>
-            </a:endParaRPr>
-          </a:p>
-          <a:p>
-            <a:pPr marL="216000" indent="-216000">
-              <a:lnSpc>
-                <a:spcPct val="90000"/>
-              </a:lnSpc>
-              <a:spcBef>
-                <a:spcPts val="1001"/>
-              </a:spcBef>
-              <a:buClr>
-                <a:srgbClr val="000000"/>
-              </a:buClr>
-              <a:buSzPct val="45000"/>
-              <a:buFont typeface="Wingdings" charset="2"/>
-              <a:buChar char=""/>
-              <a:tabLst>
-                <a:tab pos="0" algn="l"/>
-              </a:tabLst>
-            </a:pPr>
-            <a:endParaRPr lang="en-US" sz="2400" b="0" strike="noStrike" spc="-1">
-              <a:latin typeface="Arial"/>
-            </a:endParaRPr>
-          </a:p>
-          <a:p>
-            <a:pPr marL="216000" indent="-216000">
-              <a:lnSpc>
-                <a:spcPct val="90000"/>
-              </a:lnSpc>
-              <a:spcBef>
-                <a:spcPts val="1001"/>
-              </a:spcBef>
-              <a:buClr>
-                <a:srgbClr val="000000"/>
-              </a:buClr>
-              <a:buSzPct val="45000"/>
-              <a:buFont typeface="Wingdings" charset="2"/>
-              <a:buChar char=""/>
-              <a:tabLst>
-                <a:tab pos="0" algn="l"/>
-              </a:tabLst>
-            </a:pPr>
-            <a:r>
-              <a:rPr lang="en-US" sz="2400" b="0" strike="noStrike" spc="-1">
-                <a:solidFill>
-                  <a:srgbClr val="000000"/>
-                </a:solidFill>
-                <a:latin typeface="Calibri"/>
-              </a:rPr>
-              <a:t>It has a defined behavior</a:t>
-            </a:r>
-            <a:endParaRPr lang="en-US" sz="2400" b="0" strike="noStrike" spc="-1">
-              <a:latin typeface="Arial"/>
-            </a:endParaRPr>
-          </a:p>
-          <a:p>
-            <a:pPr marL="216000" indent="-216000">
-              <a:lnSpc>
-                <a:spcPct val="90000"/>
-              </a:lnSpc>
-              <a:spcBef>
-                <a:spcPts val="1001"/>
-              </a:spcBef>
-              <a:buClr>
-                <a:srgbClr val="000000"/>
-              </a:buClr>
-              <a:buSzPct val="45000"/>
-              <a:buFont typeface="Wingdings" charset="2"/>
-              <a:buChar char=""/>
-              <a:tabLst>
-                <a:tab pos="0" algn="l"/>
-              </a:tabLst>
-            </a:pPr>
-            <a:endParaRPr lang="en-US" sz="2400" b="0" strike="noStrike" spc="-1">
-              <a:latin typeface="Arial"/>
-            </a:endParaRPr>
-          </a:p>
-          <a:p>
-            <a:pPr marL="216000" indent="-216000">
-              <a:lnSpc>
-                <a:spcPct val="90000"/>
-              </a:lnSpc>
-              <a:spcBef>
-                <a:spcPts val="1001"/>
-              </a:spcBef>
-              <a:buClr>
-                <a:srgbClr val="000000"/>
-              </a:buClr>
-              <a:buSzPct val="45000"/>
-              <a:buFont typeface="Wingdings" charset="2"/>
-              <a:buChar char=""/>
-              <a:tabLst>
-                <a:tab pos="0" algn="l"/>
-              </a:tabLst>
-            </a:pPr>
-            <a:r>
-              <a:rPr lang="en-US" sz="2400" b="0" strike="noStrike" spc="-1">
-                <a:solidFill>
-                  <a:srgbClr val="000000"/>
-                </a:solidFill>
-                <a:latin typeface="Calibri"/>
-              </a:rPr>
-              <a:t>It communicates via asynchronous messages</a:t>
-            </a:r>
-            <a:endParaRPr lang="en-US" sz="2400" b="0" strike="noStrike" spc="-1">
-              <a:latin typeface="Arial"/>
-            </a:endParaRPr>
+          <p:cNvPr id="2" name="Title 1">
+            <a:extLst>
+              <a:ext uri="{FF2B5EF4-FFF2-40B4-BE49-F238E27FC236}">
+                <a16:creationId xmlns:a16="http://schemas.microsoft.com/office/drawing/2014/main" id="{C069173C-FE96-8449-92E9-36016BE62CC6}"/>
+              </a:ext>
+            </a:extLst>
+          </p:cNvPr>
+          <p:cNvSpPr>
+            <a:spLocks noGrp="1"/>
+          </p:cNvSpPr>
+          <p:nvPr>
+            <p:ph type="title"/>
+          </p:nvPr>
+        </p:nvSpPr>
+        <p:spPr>
+          <a:xfrm>
+            <a:off x="1413137" y="2595573"/>
+            <a:ext cx="9087413" cy="1408069"/>
+          </a:xfrm>
+        </p:spPr>
+        <p:txBody>
+          <a:bodyPr/>
+          <a:lstStyle/>
+          <a:p>
+            <a:pPr algn="ctr"/>
+            <a:r>
+              <a:rPr lang="en-US" dirty="0"/>
+              <a:t>Questions?</a:t>
+            </a:r>
           </a:p>
         </p:txBody>
       </p:sp>
     </p:spTree>
+    <p:extLst>
+      <p:ext uri="{BB962C8B-B14F-4D97-AF65-F5344CB8AC3E}">
+        <p14:creationId xmlns:p14="http://schemas.microsoft.com/office/powerpoint/2010/main" val="2271935361"/>
+      </p:ext>
+    </p:extLst>
   </p:cSld>
   <p:clrMapOvr>
     <a:masterClrMapping/>
@@ -3620,9 +3758,43 @@
 </p:sld>
 </file>
 
-<file path=ppt/slides/slide3.xml><?xml version="1.0" encoding="utf-8"?>
+<file path=ppt/slides/slide2.xml><?xml version="1.0" encoding="utf-8"?>
 <p:sld xmlns:a="http://schemas.openxmlformats.org/drawingml/2006/main" xmlns:r="http://schemas.openxmlformats.org/officeDocument/2006/relationships" xmlns:p="http://schemas.openxmlformats.org/presentationml/2006/main">
   <p:cSld>
+    <p:bg>
+      <p:bgPr>
+        <a:gradFill>
+          <a:gsLst>
+            <a:gs pos="24000">
+              <a:schemeClr val="accent1">
+                <a:lumMod val="5000"/>
+                <a:lumOff val="95000"/>
+              </a:schemeClr>
+            </a:gs>
+            <a:gs pos="72000">
+              <a:schemeClr val="accent1">
+                <a:lumMod val="45000"/>
+                <a:lumOff val="55000"/>
+              </a:schemeClr>
+            </a:gs>
+            <a:gs pos="83000">
+              <a:schemeClr val="accent1">
+                <a:lumMod val="45000"/>
+                <a:lumOff val="55000"/>
+              </a:schemeClr>
+            </a:gs>
+            <a:gs pos="100000">
+              <a:schemeClr val="accent1">
+                <a:lumMod val="30000"/>
+                <a:lumOff val="70000"/>
+              </a:schemeClr>
+            </a:gs>
+          </a:gsLst>
+          <a:lin ang="5400000" scaled="1"/>
+        </a:gradFill>
+        <a:effectLst/>
+      </p:bgPr>
+    </p:bg>
     <p:spTree>
       <p:nvGrpSpPr>
         <p:cNvPr id="1" name=""/>
@@ -3639,7 +3811,7 @@
       </p:grpSpPr>
       <p:sp>
         <p:nvSpPr>
-          <p:cNvPr id="45" name="TextShape 1"/>
+          <p:cNvPr id="43" name="TextShape 1"/>
           <p:cNvSpPr txBox="1"/>
           <p:nvPr/>
         </p:nvSpPr>
@@ -3674,7 +3846,7 @@
                 </a:solidFill>
                 <a:latin typeface="Calibri Light"/>
               </a:rPr>
-              <a:t>Unique Identity</a:t>
+              <a:t>What makes an actor</a:t>
             </a:r>
             <a:endParaRPr lang="en-US" sz="4800" b="0" strike="noStrike" spc="-1">
               <a:solidFill>
@@ -3687,7 +3859,7 @@
       </p:sp>
       <p:sp>
         <p:nvSpPr>
-          <p:cNvPr id="46" name="TextShape 2"/>
+          <p:cNvPr id="44" name="TextShape 2"/>
           <p:cNvSpPr txBox="1"/>
           <p:nvPr/>
         </p:nvSpPr>
@@ -3728,15 +3900,15 @@
               </a:tabLst>
             </a:pPr>
             <a:r>
-              <a:rPr lang="en-US" sz="2400" b="0" strike="noStrike" spc="-1">
+              <a:rPr lang="en-US" sz="2400" b="0" strike="noStrike" spc="-1" dirty="0">
                 <a:solidFill>
                   <a:srgbClr val="000000"/>
                 </a:solidFill>
                 <a:latin typeface="Calibri"/>
               </a:rPr>
-              <a:t>Required to know where a message originated</a:t>
-            </a:r>
-            <a:endParaRPr lang="en-US" sz="2400" b="0" strike="noStrike" spc="-1">
+              <a:t>It has a unique identity</a:t>
+            </a:r>
+            <a:endParaRPr lang="en-US" sz="2400" b="0" strike="noStrike" spc="-1" dirty="0">
               <a:latin typeface="Arial"/>
             </a:endParaRPr>
           </a:p>
@@ -3758,7 +3930,7 @@
                 <a:tab pos="0" algn="l"/>
               </a:tabLst>
             </a:pPr>
-            <a:endParaRPr lang="en-US" sz="2400" b="0" strike="noStrike" spc="-1">
+            <a:endParaRPr lang="en-US" sz="2400" b="0" strike="noStrike" spc="-1" dirty="0">
               <a:latin typeface="Arial"/>
             </a:endParaRPr>
           </a:p>
@@ -3781,15 +3953,68 @@
               </a:tabLst>
             </a:pPr>
             <a:r>
-              <a:rPr lang="en-US" sz="2400" b="0" strike="noStrike" spc="-1">
+              <a:rPr lang="en-US" sz="2400" b="0" strike="noStrike" spc="-1" dirty="0">
                 <a:solidFill>
                   <a:srgbClr val="000000"/>
                 </a:solidFill>
                 <a:latin typeface="Calibri"/>
               </a:rPr>
-              <a:t>Required to know where to send a message</a:t>
-            </a:r>
-            <a:endParaRPr lang="en-US" sz="2400" b="0" strike="noStrike" spc="-1">
+              <a:t>It has a defined behavior</a:t>
+            </a:r>
+            <a:endParaRPr lang="en-US" sz="2400" b="0" strike="noStrike" spc="-1" dirty="0">
+              <a:latin typeface="Arial"/>
+            </a:endParaRPr>
+          </a:p>
+          <a:p>
+            <a:pPr marL="216000" indent="-216000">
+              <a:lnSpc>
+                <a:spcPct val="90000"/>
+              </a:lnSpc>
+              <a:spcBef>
+                <a:spcPts val="1001"/>
+              </a:spcBef>
+              <a:buClr>
+                <a:srgbClr val="000000"/>
+              </a:buClr>
+              <a:buSzPct val="45000"/>
+              <a:buFont typeface="Wingdings" charset="2"/>
+              <a:buChar char=""/>
+              <a:tabLst>
+                <a:tab pos="0" algn="l"/>
+              </a:tabLst>
+            </a:pPr>
+            <a:endParaRPr lang="en-US" sz="2400" b="0" strike="noStrike" spc="-1" dirty="0">
+              <a:latin typeface="Arial"/>
+            </a:endParaRPr>
+          </a:p>
+          <a:p>
+            <a:pPr marL="216000" indent="-216000">
+              <a:lnSpc>
+                <a:spcPct val="90000"/>
+              </a:lnSpc>
+              <a:spcBef>
+                <a:spcPts val="1001"/>
+              </a:spcBef>
+              <a:buClr>
+                <a:srgbClr val="000000"/>
+              </a:buClr>
+              <a:buSzPct val="45000"/>
+              <a:buFont typeface="Wingdings" charset="2"/>
+              <a:buChar char=""/>
+              <a:tabLst>
+                <a:tab pos="0" algn="l"/>
+              </a:tabLst>
+            </a:pPr>
+            <a:r>
+              <a:rPr lang="en-US" sz="2400" b="0" strike="noStrike" spc="-1" dirty="0">
+                <a:solidFill>
+                  <a:srgbClr val="000000"/>
+                </a:solidFill>
+                <a:latin typeface="Calibri"/>
+              </a:rPr>
+              <a:t>It communicates via asynchronous messages</a:t>
+            </a:r>
+            <a:endParaRPr lang="en-US" sz="2400" b="0" strike="noStrike" spc="-1" dirty="0">
               <a:latin typeface="Arial"/>
             </a:endParaRPr>
           </a:p>
@@ -3803,9 +4028,43 @@
 </p:sld>
 </file>
 
-<file path=ppt/slides/slide4.xml><?xml version="1.0" encoding="utf-8"?>
+<file path=ppt/slides/slide3.xml><?xml version="1.0" encoding="utf-8"?>
 <p:sld xmlns:a="http://schemas.openxmlformats.org/drawingml/2006/main" xmlns:r="http://schemas.openxmlformats.org/officeDocument/2006/relationships" xmlns:p="http://schemas.openxmlformats.org/presentationml/2006/main">
   <p:cSld>
+    <p:bg>
+      <p:bgPr>
+        <a:gradFill>
+          <a:gsLst>
+            <a:gs pos="24000">
+              <a:schemeClr val="accent1">
+                <a:lumMod val="5000"/>
+                <a:lumOff val="95000"/>
+              </a:schemeClr>
+            </a:gs>
+            <a:gs pos="72000">
+              <a:schemeClr val="accent1">
+                <a:lumMod val="45000"/>
+                <a:lumOff val="55000"/>
+              </a:schemeClr>
+            </a:gs>
+            <a:gs pos="83000">
+              <a:schemeClr val="accent1">
+                <a:lumMod val="45000"/>
+                <a:lumOff val="55000"/>
+              </a:schemeClr>
+            </a:gs>
+            <a:gs pos="100000">
+              <a:schemeClr val="accent1">
+                <a:lumMod val="30000"/>
+                <a:lumOff val="70000"/>
+              </a:schemeClr>
+            </a:gs>
+          </a:gsLst>
+          <a:lin ang="5400000" scaled="1"/>
+        </a:gradFill>
+        <a:effectLst/>
+      </p:bgPr>
+    </p:bg>
     <p:spTree>
       <p:nvGrpSpPr>
         <p:cNvPr id="1" name=""/>
@@ -3822,7 +4081,7 @@
       </p:grpSpPr>
       <p:sp>
         <p:nvSpPr>
-          <p:cNvPr id="47" name="TextShape 1"/>
+          <p:cNvPr id="45" name="TextShape 1"/>
           <p:cNvSpPr txBox="1"/>
           <p:nvPr/>
         </p:nvSpPr>
@@ -3857,7 +4116,7 @@
                 </a:solidFill>
                 <a:latin typeface="Calibri Light"/>
               </a:rPr>
-              <a:t>Defined Behavior</a:t>
+              <a:t>Unique Identity</a:t>
             </a:r>
             <a:endParaRPr lang="en-US" sz="4800" b="0" strike="noStrike" spc="-1">
               <a:solidFill>
@@ -3870,7 +4129,7 @@
       </p:sp>
       <p:sp>
         <p:nvSpPr>
-          <p:cNvPr id="48" name="TextShape 2"/>
+          <p:cNvPr id="46" name="TextShape 2"/>
           <p:cNvSpPr txBox="1"/>
           <p:nvPr/>
         </p:nvSpPr>
@@ -3917,7 +4176,7 @@
                 </a:solidFill>
                 <a:latin typeface="Calibri"/>
               </a:rPr>
-              <a:t>Actors’ behavior defines how they process messages </a:t>
+              <a:t>Required to know where a message originated</a:t>
             </a:r>
             <a:endParaRPr lang="en-US" sz="2400" b="0" strike="noStrike" spc="-1">
               <a:latin typeface="Arial"/>
@@ -3970,83 +4229,8 @@
                 </a:solidFill>
                 <a:latin typeface="Calibri"/>
               </a:rPr>
-              <a:t>Behavior definition can change in response to a message</a:t>
-            </a:r>
-            <a:endParaRPr lang="en-US" sz="2400" b="0" strike="noStrike" spc="-1">
-              <a:latin typeface="Arial"/>
-            </a:endParaRPr>
-          </a:p>
-          <a:p>
-            <a:pPr marL="216000" indent="-216000">
-              <a:lnSpc>
-                <a:spcPct val="90000"/>
-              </a:lnSpc>
-              <a:spcBef>
-                <a:spcPts val="1001"/>
-              </a:spcBef>
-              <a:buClr>
-                <a:srgbClr val="000000"/>
-              </a:buClr>
-              <a:buSzPct val="45000"/>
-              <a:buFont typeface="Wingdings" charset="2"/>
-              <a:buChar char=""/>
-              <a:tabLst>
-                <a:tab pos="0" algn="l"/>
-              </a:tabLst>
-            </a:pPr>
-            <a:endParaRPr lang="en-US" sz="2400" b="0" strike="noStrike" spc="-1">
-              <a:latin typeface="Arial"/>
-            </a:endParaRPr>
-          </a:p>
-          <a:p>
-            <a:pPr marL="216000" indent="-216000">
-              <a:lnSpc>
-                <a:spcPct val="90000"/>
-              </a:lnSpc>
-              <a:spcBef>
-                <a:spcPts val="1001"/>
-              </a:spcBef>
-              <a:buClr>
-                <a:srgbClr val="000000"/>
-              </a:buClr>
-              <a:buSzPct val="45000"/>
-              <a:buFont typeface="Wingdings" charset="2"/>
-              <a:buChar char=""/>
-              <a:tabLst>
-                <a:tab pos="0" algn="l"/>
-              </a:tabLst>
-            </a:pPr>
-            <a:r>
-              <a:rPr lang="en-US" sz="2400" b="0" strike="noStrike" spc="-1">
-                <a:solidFill>
-                  <a:srgbClr val="000000"/>
-                </a:solidFill>
-                <a:latin typeface="Calibri"/>
-              </a:rPr>
-              <a:t>Actors can create other actors</a:t>
-            </a:r>
-            <a:endParaRPr lang="en-US" sz="2400" b="0" strike="noStrike" spc="-1">
-              <a:latin typeface="Arial"/>
-            </a:endParaRPr>
-          </a:p>
-          <a:p>
-            <a:pPr marL="216000" indent="-216000">
-              <a:lnSpc>
-                <a:spcPct val="90000"/>
-              </a:lnSpc>
-              <a:spcBef>
-                <a:spcPts val="1001"/>
-              </a:spcBef>
-              <a:buClr>
-                <a:srgbClr val="000000"/>
-              </a:buClr>
-              <a:buSzPct val="45000"/>
-              <a:buFont typeface="Wingdings" charset="2"/>
-              <a:buChar char=""/>
-              <a:tabLst>
-                <a:tab pos="0" algn="l"/>
-              </a:tabLst>
-            </a:pPr>
+              <a:t>Required to know where to send a message</a:t>
+            </a:r>
             <a:endParaRPr lang="en-US" sz="2400" b="0" strike="noStrike" spc="-1">
               <a:latin typeface="Arial"/>
             </a:endParaRPr>
@@ -4061,9 +4245,43 @@
 </p:sld>
 </file>
 
-<file path=ppt/slides/slide5.xml><?xml version="1.0" encoding="utf-8"?>
+<file path=ppt/slides/slide4.xml><?xml version="1.0" encoding="utf-8"?>
 <p:sld xmlns:a="http://schemas.openxmlformats.org/drawingml/2006/main" xmlns:r="http://schemas.openxmlformats.org/officeDocument/2006/relationships" xmlns:p="http://schemas.openxmlformats.org/presentationml/2006/main">
   <p:cSld>
+    <p:bg>
+      <p:bgPr>
+        <a:gradFill>
+          <a:gsLst>
+            <a:gs pos="24000">
+              <a:schemeClr val="accent1">
+                <a:lumMod val="5000"/>
+                <a:lumOff val="95000"/>
+              </a:schemeClr>
+            </a:gs>
+            <a:gs pos="72000">
+              <a:schemeClr val="accent1">
+                <a:lumMod val="45000"/>
+                <a:lumOff val="55000"/>
+              </a:schemeClr>
+            </a:gs>
+            <a:gs pos="83000">
+              <a:schemeClr val="accent1">
+                <a:lumMod val="45000"/>
+                <a:lumOff val="55000"/>
+              </a:schemeClr>
+            </a:gs>
+            <a:gs pos="100000">
+              <a:schemeClr val="accent1">
+                <a:lumMod val="30000"/>
+                <a:lumOff val="70000"/>
+              </a:schemeClr>
+            </a:gs>
+          </a:gsLst>
+          <a:lin ang="5400000" scaled="1"/>
+        </a:gradFill>
+        <a:effectLst/>
+      </p:bgPr>
+    </p:bg>
     <p:spTree>
       <p:nvGrpSpPr>
         <p:cNvPr id="1" name=""/>
@@ -4080,7 +4298,7 @@
       </p:grpSpPr>
       <p:sp>
         <p:nvSpPr>
-          <p:cNvPr id="49" name="TextShape 1"/>
+          <p:cNvPr id="47" name="TextShape 1"/>
           <p:cNvSpPr txBox="1"/>
           <p:nvPr/>
         </p:nvSpPr>
@@ -4115,7 +4333,7 @@
                 </a:solidFill>
                 <a:latin typeface="Calibri Light"/>
               </a:rPr>
-              <a:t>Asynchronous Messaging</a:t>
+              <a:t>Defined Behavior</a:t>
             </a:r>
             <a:endParaRPr lang="en-US" sz="4800" b="0" strike="noStrike" spc="-1">
               <a:solidFill>
@@ -4128,7 +4346,7 @@
       </p:sp>
       <p:sp>
         <p:nvSpPr>
-          <p:cNvPr id="50" name="TextShape 2"/>
+          <p:cNvPr id="48" name="TextShape 2"/>
           <p:cNvSpPr txBox="1"/>
           <p:nvPr/>
         </p:nvSpPr>
@@ -4175,7 +4393,7 @@
                 </a:solidFill>
                 <a:latin typeface="Calibri"/>
               </a:rPr>
-              <a:t>Non-blocking</a:t>
+              <a:t>Actors’ behavior defines how they process messages </a:t>
             </a:r>
             <a:endParaRPr lang="en-US" sz="2400" b="0" strike="noStrike" spc="-1">
               <a:latin typeface="Arial"/>
@@ -4228,7 +4446,7 @@
                 </a:solidFill>
                 <a:latin typeface="Calibri"/>
               </a:rPr>
-              <a:t>Only uses messaging to communicate</a:t>
+              <a:t>Behavior definition can change in response to a message</a:t>
             </a:r>
             <a:endParaRPr lang="en-US" sz="2400" b="0" strike="noStrike" spc="-1">
               <a:latin typeface="Arial"/>
@@ -4274,6 +4492,37 @@
                 <a:tab pos="0" algn="l"/>
               </a:tabLst>
             </a:pPr>
+            <a:r>
+              <a:rPr lang="en-US" sz="2400" b="0" strike="noStrike" spc="-1">
+                <a:solidFill>
+                  <a:srgbClr val="000000"/>
+                </a:solidFill>
+                <a:latin typeface="Calibri"/>
+              </a:rPr>
+              <a:t>Actors can create other actors</a:t>
+            </a:r>
+            <a:endParaRPr lang="en-US" sz="2400" b="0" strike="noStrike" spc="-1">
+              <a:latin typeface="Arial"/>
+            </a:endParaRPr>
+          </a:p>
+          <a:p>
+            <a:pPr marL="216000" indent="-216000">
+              <a:lnSpc>
+                <a:spcPct val="90000"/>
+              </a:lnSpc>
+              <a:spcBef>
+                <a:spcPts val="1001"/>
+              </a:spcBef>
+              <a:buClr>
+                <a:srgbClr val="000000"/>
+              </a:buClr>
+              <a:buSzPct val="45000"/>
+              <a:buFont typeface="Wingdings" charset="2"/>
+              <a:buChar char=""/>
+              <a:tabLst>
+                <a:tab pos="0" algn="l"/>
+              </a:tabLst>
+            </a:pPr>
             <a:endParaRPr lang="en-US" sz="2400" b="0" strike="noStrike" spc="-1">
               <a:latin typeface="Arial"/>
             </a:endParaRPr>
@@ -4288,9 +4537,43 @@
 </p:sld>
 </file>
 
-<file path=ppt/slides/slide6.xml><?xml version="1.0" encoding="utf-8"?>
+<file path=ppt/slides/slide5.xml><?xml version="1.0" encoding="utf-8"?>
 <p:sld xmlns:a="http://schemas.openxmlformats.org/drawingml/2006/main" xmlns:r="http://schemas.openxmlformats.org/officeDocument/2006/relationships" xmlns:p="http://schemas.openxmlformats.org/presentationml/2006/main">
   <p:cSld>
+    <p:bg>
+      <p:bgPr>
+        <a:gradFill>
+          <a:gsLst>
+            <a:gs pos="24000">
+              <a:schemeClr val="accent1">
+                <a:lumMod val="5000"/>
+                <a:lumOff val="95000"/>
+              </a:schemeClr>
+            </a:gs>
+            <a:gs pos="72000">
+              <a:schemeClr val="accent1">
+                <a:lumMod val="45000"/>
+                <a:lumOff val="55000"/>
+              </a:schemeClr>
+            </a:gs>
+            <a:gs pos="83000">
+              <a:schemeClr val="accent1">
+                <a:lumMod val="45000"/>
+                <a:lumOff val="55000"/>
+              </a:schemeClr>
+            </a:gs>
+            <a:gs pos="100000">
+              <a:schemeClr val="accent1">
+                <a:lumMod val="30000"/>
+                <a:lumOff val="70000"/>
+              </a:schemeClr>
+            </a:gs>
+          </a:gsLst>
+          <a:lin ang="5400000" scaled="1"/>
+        </a:gradFill>
+        <a:effectLst/>
+      </p:bgPr>
+    </p:bg>
     <p:spTree>
       <p:nvGrpSpPr>
         <p:cNvPr id="1" name=""/>
@@ -4307,7 +4590,7 @@
       </p:grpSpPr>
       <p:sp>
         <p:nvSpPr>
-          <p:cNvPr id="51" name="TextShape 1"/>
+          <p:cNvPr id="49" name="TextShape 1"/>
           <p:cNvSpPr txBox="1"/>
           <p:nvPr/>
         </p:nvSpPr>
@@ -4342,7 +4625,7 @@
                 </a:solidFill>
                 <a:latin typeface="Calibri Light"/>
               </a:rPr>
-              <a:t>Where do actors come from</a:t>
+              <a:t>Asynchronous Messaging</a:t>
             </a:r>
             <a:endParaRPr lang="en-US" sz="4800" b="0" strike="noStrike" spc="-1">
               <a:solidFill>
@@ -4355,7 +4638,7 @@
       </p:sp>
       <p:sp>
         <p:nvSpPr>
-          <p:cNvPr id="52" name="TextShape 2"/>
+          <p:cNvPr id="50" name="TextShape 2"/>
           <p:cNvSpPr txBox="1"/>
           <p:nvPr/>
         </p:nvSpPr>
@@ -4402,7 +4685,7 @@
                 </a:solidFill>
                 <a:latin typeface="Calibri"/>
               </a:rPr>
-              <a:t>Actors resemble human organization</a:t>
+              <a:t>Non-blocking</a:t>
             </a:r>
             <a:endParaRPr lang="en-US" sz="2400" b="0" strike="noStrike" spc="-1">
               <a:latin typeface="Arial"/>
@@ -4455,7 +4738,7 @@
                 </a:solidFill>
                 <a:latin typeface="Calibri"/>
               </a:rPr>
-              <a:t>Actors proposed usage for artificial intelligence</a:t>
+              <a:t>Only uses messaging to communicate</a:t>
             </a:r>
             <a:endParaRPr lang="en-US" sz="2400" b="0" strike="noStrike" spc="-1">
               <a:latin typeface="Arial"/>
@@ -4515,9 +4798,43 @@
 </p:sld>
 </file>
 
-<file path=ppt/slides/slide7.xml><?xml version="1.0" encoding="utf-8"?>
+<file path=ppt/slides/slide6.xml><?xml version="1.0" encoding="utf-8"?>
 <p:sld xmlns:a="http://schemas.openxmlformats.org/drawingml/2006/main" xmlns:r="http://schemas.openxmlformats.org/officeDocument/2006/relationships" xmlns:p="http://schemas.openxmlformats.org/presentationml/2006/main">
   <p:cSld>
+    <p:bg>
+      <p:bgPr>
+        <a:gradFill>
+          <a:gsLst>
+            <a:gs pos="24000">
+              <a:schemeClr val="accent1">
+                <a:lumMod val="5000"/>
+                <a:lumOff val="95000"/>
+              </a:schemeClr>
+            </a:gs>
+            <a:gs pos="72000">
+              <a:schemeClr val="accent1">
+                <a:lumMod val="45000"/>
+                <a:lumOff val="55000"/>
+              </a:schemeClr>
+            </a:gs>
+            <a:gs pos="83000">
+              <a:schemeClr val="accent1">
+                <a:lumMod val="45000"/>
+                <a:lumOff val="55000"/>
+              </a:schemeClr>
+            </a:gs>
+            <a:gs pos="100000">
+              <a:schemeClr val="accent1">
+                <a:lumMod val="30000"/>
+                <a:lumOff val="70000"/>
+              </a:schemeClr>
+            </a:gs>
+          </a:gsLst>
+          <a:lin ang="5400000" scaled="1"/>
+        </a:gradFill>
+        <a:effectLst/>
+      </p:bgPr>
+    </p:bg>
     <p:spTree>
       <p:nvGrpSpPr>
         <p:cNvPr id="1" name=""/>
@@ -4534,13 +4851,13 @@
       </p:grpSpPr>
       <p:sp>
         <p:nvSpPr>
-          <p:cNvPr id="53" name="TextShape 1"/>
+          <p:cNvPr id="51" name="TextShape 1"/>
           <p:cNvSpPr txBox="1"/>
           <p:nvPr/>
         </p:nvSpPr>
         <p:spPr>
           <a:xfrm>
-            <a:off x="1343127" y="0"/>
+            <a:off x="1523880" y="299520"/>
             <a:ext cx="9143640" cy="980640"/>
           </a:xfrm>
           <a:prstGeom prst="rect">
@@ -4563,15 +4880,15 @@
               </a:lnSpc>
             </a:pPr>
             <a:r>
-              <a:rPr lang="en-US" sz="4800" b="0" strike="noStrike" spc="-1" dirty="0">
+              <a:rPr lang="en-US" sz="4800" b="0" strike="noStrike" spc="-1">
                 <a:solidFill>
                   <a:srgbClr val="000000"/>
                 </a:solidFill>
                 <a:latin typeface="Calibri Light"/>
               </a:rPr>
-              <a:t>Why use actors</a:t>
-            </a:r>
-            <a:endParaRPr lang="en-US" sz="4800" b="0" strike="noStrike" spc="-1" dirty="0">
+              <a:t>Where do actors come from</a:t>
+            </a:r>
+            <a:endParaRPr lang="en-US" sz="4800" b="0" strike="noStrike" spc="-1">
               <a:solidFill>
                 <a:srgbClr val="000000"/>
               </a:solidFill>
@@ -4582,14 +4899,14 @@
       </p:sp>
       <p:sp>
         <p:nvSpPr>
-          <p:cNvPr id="54" name="TextShape 2"/>
+          <p:cNvPr id="52" name="TextShape 2"/>
           <p:cNvSpPr txBox="1"/>
           <p:nvPr/>
         </p:nvSpPr>
         <p:spPr>
           <a:xfrm>
-            <a:off x="406164" y="2700669"/>
-            <a:ext cx="4942013" cy="3593805"/>
+            <a:off x="1554480" y="2228760"/>
+            <a:ext cx="9267840" cy="2617560"/>
           </a:xfrm>
           <a:prstGeom prst="rect">
             <a:avLst/>
@@ -4601,7 +4918,7 @@
         </p:spPr>
         <p:txBody>
           <a:bodyPr>
-            <a:normAutofit lnSpcReduction="10000"/>
+            <a:normAutofit/>
           </a:bodyPr>
           <a:lstStyle/>
           <a:p>
@@ -4623,35 +4940,15 @@
               </a:tabLst>
             </a:pPr>
             <a:r>
-              <a:rPr lang="en-US" sz="2400" b="0" strike="noStrike" spc="-1" dirty="0">
+              <a:rPr lang="en-US" sz="2400" b="0" strike="noStrike" spc="-1">
                 <a:solidFill>
                   <a:srgbClr val="000000"/>
                 </a:solidFill>
                 <a:latin typeface="Calibri"/>
               </a:rPr>
-              <a:t>Simple API for multi-threading</a:t>
-            </a:r>
-            <a:endParaRPr lang="en-US" sz="2400" b="0" strike="noStrike" spc="-1" dirty="0">
-              <a:latin typeface="Arial"/>
-            </a:endParaRPr>
-          </a:p>
-          <a:p>
-            <a:pPr>
-              <a:lnSpc>
-                <a:spcPct val="90000"/>
-              </a:lnSpc>
-              <a:spcBef>
-                <a:spcPts val="1001"/>
-              </a:spcBef>
-              <a:buClr>
-                <a:srgbClr val="000000"/>
-              </a:buClr>
-              <a:buSzPct val="45000"/>
-              <a:tabLst>
-                <a:tab pos="0" algn="l"/>
-              </a:tabLst>
-            </a:pPr>
-            <a:endParaRPr lang="en-US" sz="2400" b="0" strike="noStrike" spc="-1" dirty="0">
+              <a:t>Actors resemble human organization</a:t>
+            </a:r>
+            <a:endParaRPr lang="en-US" sz="2400" b="0" strike="noStrike" spc="-1">
               <a:latin typeface="Arial"/>
             </a:endParaRPr>
           </a:p>
@@ -4673,16 +4970,7 @@
                 <a:tab pos="0" algn="l"/>
               </a:tabLst>
             </a:pPr>
-            <a:r>
-              <a:rPr lang="en-US" sz="2400" b="0" strike="noStrike" spc="-1" dirty="0">
-                <a:solidFill>
-                  <a:srgbClr val="000000"/>
-                </a:solidFill>
-                <a:latin typeface="Calibri"/>
-              </a:rPr>
-              <a:t>Actors are easily created and easily removed</a:t>
-            </a:r>
-            <a:endParaRPr lang="en-US" sz="2400" b="0" strike="noStrike" spc="-1" dirty="0">
+            <a:endParaRPr lang="en-US" sz="2400" b="0" strike="noStrike" spc="-1">
               <a:latin typeface="Arial"/>
             </a:endParaRPr>
           </a:p>
@@ -4704,7 +4992,16 @@
                 <a:tab pos="0" algn="l"/>
               </a:tabLst>
             </a:pPr>
-            <a:endParaRPr lang="en-US" sz="2400" b="0" strike="noStrike" spc="-1" dirty="0">
+            <a:r>
+              <a:rPr lang="en-US" sz="2400" b="0" strike="noStrike" spc="-1">
+                <a:solidFill>
+                  <a:srgbClr val="000000"/>
+                </a:solidFill>
+                <a:latin typeface="Calibri"/>
+              </a:rPr>
+              <a:t>Actors proposed usage for artificial intelligence</a:t>
+            </a:r>
+            <a:endParaRPr lang="en-US" sz="2400" b="0" strike="noStrike" spc="-1">
               <a:latin typeface="Arial"/>
             </a:endParaRPr>
           </a:p>
@@ -4726,16 +5023,7 @@
                 <a:tab pos="0" algn="l"/>
               </a:tabLst>
             </a:pPr>
-            <a:r>
-              <a:rPr lang="en-US" sz="2400" b="0" strike="noStrike" spc="-1" dirty="0">
-                <a:solidFill>
-                  <a:srgbClr val="000000"/>
-                </a:solidFill>
-                <a:latin typeface="Calibri"/>
-              </a:rPr>
-              <a:t>Automatically handle race conditions</a:t>
-            </a:r>
-            <a:endParaRPr lang="en-US" sz="2400" b="0" strike="noStrike" spc="-1" dirty="0">
+            <a:endParaRPr lang="en-US" sz="2400" b="0" strike="noStrike" spc="-1">
               <a:latin typeface="Arial"/>
             </a:endParaRPr>
           </a:p>
@@ -4757,303 +5045,8 @@
                 <a:tab pos="0" algn="l"/>
               </a:tabLst>
             </a:pPr>
-            <a:endParaRPr lang="en-US" sz="2400" b="0" strike="noStrike" spc="-1" dirty="0">
+            <a:endParaRPr lang="en-US" sz="2400" b="0" strike="noStrike" spc="-1">
               <a:latin typeface="Arial"/>
-            </a:endParaRPr>
-          </a:p>
-          <a:p>
-            <a:pPr marL="216000" indent="-216000">
-              <a:lnSpc>
-                <a:spcPct val="90000"/>
-              </a:lnSpc>
-              <a:spcBef>
-                <a:spcPts val="1001"/>
-              </a:spcBef>
-              <a:buClr>
-                <a:srgbClr val="000000"/>
-              </a:buClr>
-              <a:buSzPct val="45000"/>
-              <a:buFont typeface="Wingdings" charset="2"/>
-              <a:buChar char=""/>
-              <a:tabLst>
-                <a:tab pos="0" algn="l"/>
-              </a:tabLst>
-            </a:pPr>
-            <a:r>
-              <a:rPr lang="en-US" sz="2400" b="0" strike="noStrike" spc="-1" dirty="0">
-                <a:solidFill>
-                  <a:srgbClr val="000000"/>
-                </a:solidFill>
-                <a:latin typeface="Calibri"/>
-              </a:rPr>
-              <a:t>No tight coupling</a:t>
-            </a:r>
-            <a:endParaRPr lang="en-US" sz="2400" b="0" strike="noStrike" spc="-1" dirty="0">
-              <a:latin typeface="Arial"/>
-            </a:endParaRPr>
-          </a:p>
-        </p:txBody>
-      </p:sp>
-      <p:sp>
-        <p:nvSpPr>
-          <p:cNvPr id="4" name="TextShape 2">
-            <a:extLst>
-              <a:ext uri="{FF2B5EF4-FFF2-40B4-BE49-F238E27FC236}">
-                <a16:creationId xmlns:a16="http://schemas.microsoft.com/office/drawing/2014/main" id="{A6365CDA-4443-5C46-8084-099D8FA565DF}"/>
-              </a:ext>
-            </a:extLst>
-          </p:cNvPr>
-          <p:cNvSpPr txBox="1"/>
-          <p:nvPr/>
-        </p:nvSpPr>
-        <p:spPr>
-          <a:xfrm>
-            <a:off x="6523430" y="2700669"/>
-            <a:ext cx="4942013" cy="3593805"/>
-          </a:xfrm>
-          <a:prstGeom prst="rect">
-            <a:avLst/>
-          </a:prstGeom>
-          <a:noFill/>
-          <a:ln>
-            <a:noFill/>
-          </a:ln>
-        </p:spPr>
-        <p:txBody>
-          <a:bodyPr>
-            <a:normAutofit/>
-          </a:bodyPr>
-          <a:lstStyle/>
-          <a:p>
-            <a:pPr marL="216000" indent="-216000">
-              <a:lnSpc>
-                <a:spcPct val="90000"/>
-              </a:lnSpc>
-              <a:spcBef>
-                <a:spcPts val="1001"/>
-              </a:spcBef>
-              <a:buClr>
-                <a:srgbClr val="000000"/>
-              </a:buClr>
-              <a:buSzPct val="45000"/>
-              <a:buFont typeface="Wingdings" charset="2"/>
-              <a:buChar char=""/>
-              <a:tabLst>
-                <a:tab pos="0" algn="l"/>
-              </a:tabLst>
-            </a:pPr>
-            <a:r>
-              <a:rPr lang="en-US" sz="2400" b="0" strike="noStrike" spc="-1" dirty="0">
-                <a:solidFill>
-                  <a:srgbClr val="000000"/>
-                </a:solidFill>
-                <a:latin typeface="Calibri"/>
-              </a:rPr>
-              <a:t>Actors are susceptible to deadlocks</a:t>
-            </a:r>
-            <a:endParaRPr lang="en-US" sz="2400" b="0" strike="noStrike" spc="-1" dirty="0">
-              <a:latin typeface="Arial"/>
-            </a:endParaRPr>
-          </a:p>
-          <a:p>
-            <a:pPr>
-              <a:lnSpc>
-                <a:spcPct val="90000"/>
-              </a:lnSpc>
-              <a:spcBef>
-                <a:spcPts val="1001"/>
-              </a:spcBef>
-              <a:buClr>
-                <a:srgbClr val="000000"/>
-              </a:buClr>
-              <a:buSzPct val="45000"/>
-              <a:tabLst>
-                <a:tab pos="0" algn="l"/>
-              </a:tabLst>
-            </a:pPr>
-            <a:endParaRPr lang="en-US" sz="2400" b="0" strike="noStrike" spc="-1" dirty="0">
-              <a:latin typeface="Arial"/>
-            </a:endParaRPr>
-          </a:p>
-          <a:p>
-            <a:pPr marL="216000" indent="-216000">
-              <a:lnSpc>
-                <a:spcPct val="90000"/>
-              </a:lnSpc>
-              <a:spcBef>
-                <a:spcPts val="1001"/>
-              </a:spcBef>
-              <a:buClr>
-                <a:srgbClr val="000000"/>
-              </a:buClr>
-              <a:buSzPct val="45000"/>
-              <a:buFont typeface="Wingdings" charset="2"/>
-              <a:buChar char=""/>
-              <a:tabLst>
-                <a:tab pos="0" algn="l"/>
-              </a:tabLst>
-            </a:pPr>
-            <a:r>
-              <a:rPr lang="en-US" sz="2400" b="0" strike="noStrike" spc="-1" dirty="0">
-                <a:solidFill>
-                  <a:srgbClr val="000000"/>
-                </a:solidFill>
-                <a:latin typeface="Calibri"/>
-              </a:rPr>
-              <a:t>Actor’s mailbox can overflow</a:t>
-            </a:r>
-            <a:br>
-              <a:rPr lang="en-US" sz="2400" b="0" strike="noStrike" spc="-1" dirty="0">
-                <a:solidFill>
-                  <a:srgbClr val="000000"/>
-                </a:solidFill>
-                <a:latin typeface="Calibri"/>
-              </a:rPr>
-            </a:br>
-            <a:endParaRPr lang="en-US" sz="2400" b="0" strike="noStrike" spc="-1" dirty="0">
-              <a:solidFill>
-                <a:srgbClr val="000000"/>
-              </a:solidFill>
-              <a:latin typeface="Calibri"/>
-            </a:endParaRPr>
-          </a:p>
-          <a:p>
-            <a:pPr marL="216000" indent="-216000">
-              <a:lnSpc>
-                <a:spcPct val="90000"/>
-              </a:lnSpc>
-              <a:spcBef>
-                <a:spcPts val="1001"/>
-              </a:spcBef>
-              <a:buClr>
-                <a:srgbClr val="000000"/>
-              </a:buClr>
-              <a:buSzPct val="45000"/>
-              <a:buFont typeface="Wingdings" charset="2"/>
-              <a:buChar char=""/>
-              <a:tabLst>
-                <a:tab pos="0" algn="l"/>
-              </a:tabLst>
-            </a:pPr>
-            <a:r>
-              <a:rPr lang="en-US" sz="2400" spc="-1" dirty="0">
-                <a:solidFill>
-                  <a:srgbClr val="000000"/>
-                </a:solidFill>
-                <a:latin typeface="Calibri"/>
-              </a:rPr>
-              <a:t>Requires developer to be more diligent in handling multi-threading challenges</a:t>
-            </a:r>
-            <a:endParaRPr lang="en-US" sz="2400" b="0" strike="noStrike" spc="-1" dirty="0">
-              <a:latin typeface="Arial"/>
-            </a:endParaRPr>
-          </a:p>
-        </p:txBody>
-      </p:sp>
-      <p:sp>
-        <p:nvSpPr>
-          <p:cNvPr id="5" name="TextShape 1">
-            <a:extLst>
-              <a:ext uri="{FF2B5EF4-FFF2-40B4-BE49-F238E27FC236}">
-                <a16:creationId xmlns:a16="http://schemas.microsoft.com/office/drawing/2014/main" id="{AAE3EF12-965A-9D48-996A-50A44CF7AD97}"/>
-              </a:ext>
-            </a:extLst>
-          </p:cNvPr>
-          <p:cNvSpPr txBox="1"/>
-          <p:nvPr/>
-        </p:nvSpPr>
-        <p:spPr>
-          <a:xfrm>
-            <a:off x="406164" y="1287761"/>
-            <a:ext cx="4607562" cy="1105787"/>
-          </a:xfrm>
-          <a:prstGeom prst="rect">
-            <a:avLst/>
-          </a:prstGeom>
-          <a:noFill/>
-          <a:ln>
-            <a:noFill/>
-          </a:ln>
-        </p:spPr>
-        <p:txBody>
-          <a:bodyPr anchor="b">
-            <a:noAutofit/>
-          </a:bodyPr>
-          <a:lstStyle/>
-          <a:p>
-            <a:pPr algn="ctr">
-              <a:lnSpc>
-                <a:spcPct val="90000"/>
-              </a:lnSpc>
-            </a:pPr>
-            <a:r>
-              <a:rPr lang="en-US" sz="4800" b="0" strike="noStrike" spc="-1" dirty="0">
-                <a:solidFill>
-                  <a:srgbClr val="000000"/>
-                </a:solidFill>
-                <a:latin typeface="Calibri Light"/>
-              </a:rPr>
-              <a:t>PROS</a:t>
-            </a:r>
-            <a:endParaRPr lang="en-US" sz="4800" b="0" strike="noStrike" spc="-1" dirty="0">
-              <a:solidFill>
-                <a:srgbClr val="000000"/>
-              </a:solidFill>
-              <a:latin typeface="Calibri"/>
-            </a:endParaRPr>
-          </a:p>
-        </p:txBody>
-      </p:sp>
-      <p:sp>
-        <p:nvSpPr>
-          <p:cNvPr id="6" name="TextShape 1">
-            <a:extLst>
-              <a:ext uri="{FF2B5EF4-FFF2-40B4-BE49-F238E27FC236}">
-                <a16:creationId xmlns:a16="http://schemas.microsoft.com/office/drawing/2014/main" id="{687FCAFB-040E-FD4A-92FD-B36DBE084954}"/>
-              </a:ext>
-            </a:extLst>
-          </p:cNvPr>
-          <p:cNvSpPr txBox="1"/>
-          <p:nvPr/>
-        </p:nvSpPr>
-        <p:spPr>
-          <a:xfrm>
-            <a:off x="6857881" y="1287761"/>
-            <a:ext cx="4607562" cy="1105787"/>
-          </a:xfrm>
-          <a:prstGeom prst="rect">
-            <a:avLst/>
-          </a:prstGeom>
-          <a:noFill/>
-          <a:ln>
-            <a:noFill/>
-          </a:ln>
-        </p:spPr>
-        <p:txBody>
-          <a:bodyPr anchor="b">
-            <a:noAutofit/>
-          </a:bodyPr>
-          <a:lstStyle/>
-          <a:p>
-            <a:pPr algn="ctr">
-              <a:lnSpc>
-                <a:spcPct val="90000"/>
-              </a:lnSpc>
-            </a:pPr>
-            <a:r>
-              <a:rPr lang="en-US" sz="4800" b="0" strike="noStrike" spc="-1" dirty="0">
-                <a:solidFill>
-                  <a:srgbClr val="000000"/>
-                </a:solidFill>
-                <a:latin typeface="Calibri Light"/>
-              </a:rPr>
-              <a:t>CONS</a:t>
-            </a:r>
-            <a:endParaRPr lang="en-US" sz="4800" b="0" strike="noStrike" spc="-1" dirty="0">
-              <a:solidFill>
-                <a:srgbClr val="000000"/>
-              </a:solidFill>
-              <a:latin typeface="Calibri"/>
             </a:endParaRPr>
           </a:p>
         </p:txBody>
@@ -5066,9 +5059,43 @@
 </p:sld>
 </file>
 
-<file path=ppt/slides/slide8.xml><?xml version="1.0" encoding="utf-8"?>
+<file path=ppt/slides/slide7.xml><?xml version="1.0" encoding="utf-8"?>
 <p:sld xmlns:a="http://schemas.openxmlformats.org/drawingml/2006/main" xmlns:r="http://schemas.openxmlformats.org/officeDocument/2006/relationships" xmlns:p="http://schemas.openxmlformats.org/presentationml/2006/main">
   <p:cSld>
+    <p:bg>
+      <p:bgPr>
+        <a:gradFill>
+          <a:gsLst>
+            <a:gs pos="24000">
+              <a:schemeClr val="accent1">
+                <a:lumMod val="5000"/>
+                <a:lumOff val="95000"/>
+              </a:schemeClr>
+            </a:gs>
+            <a:gs pos="72000">
+              <a:schemeClr val="accent1">
+                <a:lumMod val="45000"/>
+                <a:lumOff val="55000"/>
+              </a:schemeClr>
+            </a:gs>
+            <a:gs pos="83000">
+              <a:schemeClr val="accent1">
+                <a:lumMod val="45000"/>
+                <a:lumOff val="55000"/>
+              </a:schemeClr>
+            </a:gs>
+            <a:gs pos="100000">
+              <a:schemeClr val="accent1">
+                <a:lumMod val="30000"/>
+                <a:lumOff val="70000"/>
+              </a:schemeClr>
+            </a:gs>
+          </a:gsLst>
+          <a:lin ang="5400000" scaled="1"/>
+        </a:gradFill>
+        <a:effectLst/>
+      </p:bgPr>
+    </p:bg>
     <p:spTree>
       <p:nvGrpSpPr>
         <p:cNvPr id="1" name=""/>
@@ -5085,6 +5112,560 @@
       </p:grpSpPr>
       <p:sp>
         <p:nvSpPr>
+          <p:cNvPr id="53" name="TextShape 1"/>
+          <p:cNvSpPr txBox="1"/>
+          <p:nvPr/>
+        </p:nvSpPr>
+        <p:spPr>
+          <a:xfrm>
+            <a:off x="1343127" y="0"/>
+            <a:ext cx="9143640" cy="980640"/>
+          </a:xfrm>
+          <a:prstGeom prst="rect">
+            <a:avLst/>
+          </a:prstGeom>
+          <a:noFill/>
+          <a:ln>
+            <a:noFill/>
+          </a:ln>
+        </p:spPr>
+        <p:txBody>
+          <a:bodyPr anchor="b">
+            <a:noAutofit/>
+          </a:bodyPr>
+          <a:lstStyle/>
+          <a:p>
+            <a:pPr algn="ctr">
+              <a:lnSpc>
+                <a:spcPct val="90000"/>
+              </a:lnSpc>
+            </a:pPr>
+            <a:r>
+              <a:rPr lang="en-US" sz="4800" b="0" strike="noStrike" spc="-1" dirty="0">
+                <a:solidFill>
+                  <a:srgbClr val="000000"/>
+                </a:solidFill>
+                <a:latin typeface="Calibri Light"/>
+              </a:rPr>
+              <a:t>Why use actors</a:t>
+            </a:r>
+            <a:endParaRPr lang="en-US" sz="4800" b="0" strike="noStrike" spc="-1" dirty="0">
+              <a:solidFill>
+                <a:srgbClr val="000000"/>
+              </a:solidFill>
+              <a:latin typeface="Calibri"/>
+            </a:endParaRPr>
+          </a:p>
+        </p:txBody>
+      </p:sp>
+      <p:sp>
+        <p:nvSpPr>
+          <p:cNvPr id="54" name="TextShape 2"/>
+          <p:cNvSpPr txBox="1"/>
+          <p:nvPr/>
+        </p:nvSpPr>
+        <p:spPr>
+          <a:xfrm>
+            <a:off x="406164" y="2700669"/>
+            <a:ext cx="4942013" cy="3593805"/>
+          </a:xfrm>
+          <a:prstGeom prst="rect">
+            <a:avLst/>
+          </a:prstGeom>
+          <a:noFill/>
+          <a:ln>
+            <a:noFill/>
+          </a:ln>
+        </p:spPr>
+        <p:txBody>
+          <a:bodyPr>
+            <a:normAutofit lnSpcReduction="10000"/>
+          </a:bodyPr>
+          <a:lstStyle/>
+          <a:p>
+            <a:pPr marL="216000" indent="-216000">
+              <a:lnSpc>
+                <a:spcPct val="90000"/>
+              </a:lnSpc>
+              <a:spcBef>
+                <a:spcPts val="1001"/>
+              </a:spcBef>
+              <a:buClr>
+                <a:srgbClr val="000000"/>
+              </a:buClr>
+              <a:buSzPct val="45000"/>
+              <a:buFont typeface="Wingdings" charset="2"/>
+              <a:buChar char=""/>
+              <a:tabLst>
+                <a:tab pos="0" algn="l"/>
+              </a:tabLst>
+            </a:pPr>
+            <a:r>
+              <a:rPr lang="en-US" sz="2400" b="0" strike="noStrike" spc="-1" dirty="0">
+                <a:solidFill>
+                  <a:srgbClr val="000000"/>
+                </a:solidFill>
+                <a:latin typeface="Calibri"/>
+              </a:rPr>
+              <a:t>Simple API for multi-threading</a:t>
+            </a:r>
+            <a:endParaRPr lang="en-US" sz="2400" b="0" strike="noStrike" spc="-1" dirty="0">
+              <a:latin typeface="Arial"/>
+            </a:endParaRPr>
+          </a:p>
+          <a:p>
+            <a:pPr>
+              <a:lnSpc>
+                <a:spcPct val="90000"/>
+              </a:lnSpc>
+              <a:spcBef>
+                <a:spcPts val="1001"/>
+              </a:spcBef>
+              <a:buClr>
+                <a:srgbClr val="000000"/>
+              </a:buClr>
+              <a:buSzPct val="45000"/>
+              <a:tabLst>
+                <a:tab pos="0" algn="l"/>
+              </a:tabLst>
+            </a:pPr>
+            <a:endParaRPr lang="en-US" sz="2400" b="0" strike="noStrike" spc="-1" dirty="0">
+              <a:latin typeface="Arial"/>
+            </a:endParaRPr>
+          </a:p>
+          <a:p>
+            <a:pPr marL="216000" indent="-216000">
+              <a:lnSpc>
+                <a:spcPct val="90000"/>
+              </a:lnSpc>
+              <a:spcBef>
+                <a:spcPts val="1001"/>
+              </a:spcBef>
+              <a:buClr>
+                <a:srgbClr val="000000"/>
+              </a:buClr>
+              <a:buSzPct val="45000"/>
+              <a:buFont typeface="Wingdings" charset="2"/>
+              <a:buChar char=""/>
+              <a:tabLst>
+                <a:tab pos="0" algn="l"/>
+              </a:tabLst>
+            </a:pPr>
+            <a:r>
+              <a:rPr lang="en-US" sz="2400" b="0" strike="noStrike" spc="-1" dirty="0">
+                <a:solidFill>
+                  <a:srgbClr val="000000"/>
+                </a:solidFill>
+                <a:latin typeface="Calibri"/>
+              </a:rPr>
+              <a:t>Actors are easily created and easily removed</a:t>
+            </a:r>
+            <a:endParaRPr lang="en-US" sz="2400" b="0" strike="noStrike" spc="-1" dirty="0">
+              <a:latin typeface="Arial"/>
+            </a:endParaRPr>
+          </a:p>
+          <a:p>
+            <a:pPr marL="216000" indent="-216000">
+              <a:lnSpc>
+                <a:spcPct val="90000"/>
+              </a:lnSpc>
+              <a:spcBef>
+                <a:spcPts val="1001"/>
+              </a:spcBef>
+              <a:buClr>
+                <a:srgbClr val="000000"/>
+              </a:buClr>
+              <a:buSzPct val="45000"/>
+              <a:buFont typeface="Wingdings" charset="2"/>
+              <a:buChar char=""/>
+              <a:tabLst>
+                <a:tab pos="0" algn="l"/>
+              </a:tabLst>
+            </a:pPr>
+            <a:endParaRPr lang="en-US" sz="2400" b="0" strike="noStrike" spc="-1" dirty="0">
+              <a:latin typeface="Arial"/>
+            </a:endParaRPr>
+          </a:p>
+          <a:p>
+            <a:pPr marL="216000" indent="-216000">
+              <a:lnSpc>
+                <a:spcPct val="90000"/>
+              </a:lnSpc>
+              <a:spcBef>
+                <a:spcPts val="1001"/>
+              </a:spcBef>
+              <a:buClr>
+                <a:srgbClr val="000000"/>
+              </a:buClr>
+              <a:buSzPct val="45000"/>
+              <a:buFont typeface="Wingdings" charset="2"/>
+              <a:buChar char=""/>
+              <a:tabLst>
+                <a:tab pos="0" algn="l"/>
+              </a:tabLst>
+            </a:pPr>
+            <a:r>
+              <a:rPr lang="en-US" sz="2400" b="0" strike="noStrike" spc="-1" dirty="0">
+                <a:solidFill>
+                  <a:srgbClr val="000000"/>
+                </a:solidFill>
+                <a:latin typeface="Calibri"/>
+              </a:rPr>
+              <a:t>Automatically handle race conditions</a:t>
+            </a:r>
+            <a:endParaRPr lang="en-US" sz="2400" b="0" strike="noStrike" spc="-1" dirty="0">
+              <a:latin typeface="Arial"/>
+            </a:endParaRPr>
+          </a:p>
+          <a:p>
+            <a:pPr marL="216000" indent="-216000">
+              <a:lnSpc>
+                <a:spcPct val="90000"/>
+              </a:lnSpc>
+              <a:spcBef>
+                <a:spcPts val="1001"/>
+              </a:spcBef>
+              <a:buClr>
+                <a:srgbClr val="000000"/>
+              </a:buClr>
+              <a:buSzPct val="45000"/>
+              <a:buFont typeface="Wingdings" charset="2"/>
+              <a:buChar char=""/>
+              <a:tabLst>
+                <a:tab pos="0" algn="l"/>
+              </a:tabLst>
+            </a:pPr>
+            <a:endParaRPr lang="en-US" sz="2400" b="0" strike="noStrike" spc="-1" dirty="0">
+              <a:latin typeface="Arial"/>
+            </a:endParaRPr>
+          </a:p>
+          <a:p>
+            <a:pPr marL="216000" indent="-216000">
+              <a:lnSpc>
+                <a:spcPct val="90000"/>
+              </a:lnSpc>
+              <a:spcBef>
+                <a:spcPts val="1001"/>
+              </a:spcBef>
+              <a:buClr>
+                <a:srgbClr val="000000"/>
+              </a:buClr>
+              <a:buSzPct val="45000"/>
+              <a:buFont typeface="Wingdings" charset="2"/>
+              <a:buChar char=""/>
+              <a:tabLst>
+                <a:tab pos="0" algn="l"/>
+              </a:tabLst>
+            </a:pPr>
+            <a:r>
+              <a:rPr lang="en-US" sz="2400" b="0" strike="noStrike" spc="-1" dirty="0">
+                <a:solidFill>
+                  <a:srgbClr val="000000"/>
+                </a:solidFill>
+                <a:latin typeface="Calibri"/>
+              </a:rPr>
+              <a:t>No tight coupling</a:t>
+            </a:r>
+            <a:endParaRPr lang="en-US" sz="2400" b="0" strike="noStrike" spc="-1" dirty="0">
+              <a:latin typeface="Arial"/>
+            </a:endParaRPr>
+          </a:p>
+        </p:txBody>
+      </p:sp>
+      <p:sp>
+        <p:nvSpPr>
+          <p:cNvPr id="4" name="TextShape 2">
+            <a:extLst>
+              <a:ext uri="{FF2B5EF4-FFF2-40B4-BE49-F238E27FC236}">
+                <a16:creationId xmlns:a16="http://schemas.microsoft.com/office/drawing/2014/main" id="{A6365CDA-4443-5C46-8084-099D8FA565DF}"/>
+              </a:ext>
+            </a:extLst>
+          </p:cNvPr>
+          <p:cNvSpPr txBox="1"/>
+          <p:nvPr/>
+        </p:nvSpPr>
+        <p:spPr>
+          <a:xfrm>
+            <a:off x="6523430" y="2700669"/>
+            <a:ext cx="4942013" cy="3593805"/>
+          </a:xfrm>
+          <a:prstGeom prst="rect">
+            <a:avLst/>
+          </a:prstGeom>
+          <a:noFill/>
+          <a:ln>
+            <a:noFill/>
+          </a:ln>
+        </p:spPr>
+        <p:txBody>
+          <a:bodyPr>
+            <a:normAutofit/>
+          </a:bodyPr>
+          <a:lstStyle/>
+          <a:p>
+            <a:pPr marL="216000" indent="-216000">
+              <a:lnSpc>
+                <a:spcPct val="90000"/>
+              </a:lnSpc>
+              <a:spcBef>
+                <a:spcPts val="1001"/>
+              </a:spcBef>
+              <a:buClr>
+                <a:srgbClr val="000000"/>
+              </a:buClr>
+              <a:buSzPct val="45000"/>
+              <a:buFont typeface="Wingdings" charset="2"/>
+              <a:buChar char=""/>
+              <a:tabLst>
+                <a:tab pos="0" algn="l"/>
+              </a:tabLst>
+            </a:pPr>
+            <a:r>
+              <a:rPr lang="en-US" sz="2400" b="0" strike="noStrike" spc="-1" dirty="0">
+                <a:solidFill>
+                  <a:srgbClr val="000000"/>
+                </a:solidFill>
+                <a:latin typeface="Calibri"/>
+              </a:rPr>
+              <a:t>Actors are susceptible to deadlocks</a:t>
+            </a:r>
+            <a:endParaRPr lang="en-US" sz="2400" b="0" strike="noStrike" spc="-1" dirty="0">
+              <a:latin typeface="Arial"/>
+            </a:endParaRPr>
+          </a:p>
+          <a:p>
+            <a:pPr>
+              <a:lnSpc>
+                <a:spcPct val="90000"/>
+              </a:lnSpc>
+              <a:spcBef>
+                <a:spcPts val="1001"/>
+              </a:spcBef>
+              <a:buClr>
+                <a:srgbClr val="000000"/>
+              </a:buClr>
+              <a:buSzPct val="45000"/>
+              <a:tabLst>
+                <a:tab pos="0" algn="l"/>
+              </a:tabLst>
+            </a:pPr>
+            <a:endParaRPr lang="en-US" sz="2400" b="0" strike="noStrike" spc="-1" dirty="0">
+              <a:latin typeface="Arial"/>
+            </a:endParaRPr>
+          </a:p>
+          <a:p>
+            <a:pPr marL="216000" indent="-216000">
+              <a:lnSpc>
+                <a:spcPct val="90000"/>
+              </a:lnSpc>
+              <a:spcBef>
+                <a:spcPts val="1001"/>
+              </a:spcBef>
+              <a:buClr>
+                <a:srgbClr val="000000"/>
+              </a:buClr>
+              <a:buSzPct val="45000"/>
+              <a:buFont typeface="Wingdings" charset="2"/>
+              <a:buChar char=""/>
+              <a:tabLst>
+                <a:tab pos="0" algn="l"/>
+              </a:tabLst>
+            </a:pPr>
+            <a:r>
+              <a:rPr lang="en-US" sz="2400" b="0" strike="noStrike" spc="-1" dirty="0">
+                <a:solidFill>
+                  <a:srgbClr val="000000"/>
+                </a:solidFill>
+                <a:latin typeface="Calibri"/>
+              </a:rPr>
+              <a:t>Actor’s mailbox can overflow</a:t>
+            </a:r>
+            <a:br>
+              <a:rPr lang="en-US" sz="2400" b="0" strike="noStrike" spc="-1" dirty="0">
+                <a:solidFill>
+                  <a:srgbClr val="000000"/>
+                </a:solidFill>
+                <a:latin typeface="Calibri"/>
+              </a:rPr>
+            </a:br>
+            <a:endParaRPr lang="en-US" sz="2400" b="0" strike="noStrike" spc="-1" dirty="0">
+              <a:solidFill>
+                <a:srgbClr val="000000"/>
+              </a:solidFill>
+              <a:latin typeface="Calibri"/>
+            </a:endParaRPr>
+          </a:p>
+        </p:txBody>
+      </p:sp>
+      <p:sp>
+        <p:nvSpPr>
+          <p:cNvPr id="5" name="TextShape 1">
+            <a:extLst>
+              <a:ext uri="{FF2B5EF4-FFF2-40B4-BE49-F238E27FC236}">
+                <a16:creationId xmlns:a16="http://schemas.microsoft.com/office/drawing/2014/main" id="{AAE3EF12-965A-9D48-996A-50A44CF7AD97}"/>
+              </a:ext>
+            </a:extLst>
+          </p:cNvPr>
+          <p:cNvSpPr txBox="1"/>
+          <p:nvPr/>
+        </p:nvSpPr>
+        <p:spPr>
+          <a:xfrm>
+            <a:off x="406164" y="1287761"/>
+            <a:ext cx="4607562" cy="1105787"/>
+          </a:xfrm>
+          <a:prstGeom prst="rect">
+            <a:avLst/>
+          </a:prstGeom>
+          <a:noFill/>
+          <a:ln>
+            <a:noFill/>
+          </a:ln>
+        </p:spPr>
+        <p:txBody>
+          <a:bodyPr anchor="b">
+            <a:noAutofit/>
+          </a:bodyPr>
+          <a:lstStyle/>
+          <a:p>
+            <a:pPr algn="ctr">
+              <a:lnSpc>
+                <a:spcPct val="90000"/>
+              </a:lnSpc>
+            </a:pPr>
+            <a:r>
+              <a:rPr lang="en-US" sz="4800" b="0" strike="noStrike" spc="-1" dirty="0">
+                <a:solidFill>
+                  <a:srgbClr val="000000"/>
+                </a:solidFill>
+                <a:latin typeface="Calibri Light"/>
+              </a:rPr>
+              <a:t>PROS</a:t>
+            </a:r>
+            <a:endParaRPr lang="en-US" sz="4800" b="0" strike="noStrike" spc="-1" dirty="0">
+              <a:solidFill>
+                <a:srgbClr val="000000"/>
+              </a:solidFill>
+              <a:latin typeface="Calibri"/>
+            </a:endParaRPr>
+          </a:p>
+        </p:txBody>
+      </p:sp>
+      <p:sp>
+        <p:nvSpPr>
+          <p:cNvPr id="6" name="TextShape 1">
+            <a:extLst>
+              <a:ext uri="{FF2B5EF4-FFF2-40B4-BE49-F238E27FC236}">
+                <a16:creationId xmlns:a16="http://schemas.microsoft.com/office/drawing/2014/main" id="{687FCAFB-040E-FD4A-92FD-B36DBE084954}"/>
+              </a:ext>
+            </a:extLst>
+          </p:cNvPr>
+          <p:cNvSpPr txBox="1"/>
+          <p:nvPr/>
+        </p:nvSpPr>
+        <p:spPr>
+          <a:xfrm>
+            <a:off x="6857881" y="1287761"/>
+            <a:ext cx="4607562" cy="1105787"/>
+          </a:xfrm>
+          <a:prstGeom prst="rect">
+            <a:avLst/>
+          </a:prstGeom>
+          <a:noFill/>
+          <a:ln>
+            <a:noFill/>
+          </a:ln>
+        </p:spPr>
+        <p:txBody>
+          <a:bodyPr anchor="b">
+            <a:noAutofit/>
+          </a:bodyPr>
+          <a:lstStyle/>
+          <a:p>
+            <a:pPr algn="ctr">
+              <a:lnSpc>
+                <a:spcPct val="90000"/>
+              </a:lnSpc>
+            </a:pPr>
+            <a:r>
+              <a:rPr lang="en-US" sz="4800" b="0" strike="noStrike" spc="-1" dirty="0">
+                <a:solidFill>
+                  <a:srgbClr val="000000"/>
+                </a:solidFill>
+                <a:latin typeface="Calibri Light"/>
+              </a:rPr>
+              <a:t>CONS</a:t>
+            </a:r>
+            <a:endParaRPr lang="en-US" sz="4800" b="0" strike="noStrike" spc="-1" dirty="0">
+              <a:solidFill>
+                <a:srgbClr val="000000"/>
+              </a:solidFill>
+              <a:latin typeface="Calibri"/>
+            </a:endParaRPr>
+          </a:p>
+        </p:txBody>
+      </p:sp>
+    </p:spTree>
+  </p:cSld>
+  <p:clrMapOvr>
+    <a:masterClrMapping/>
+  </p:clrMapOvr>
+</p:sld>
+</file>
+
+<file path=ppt/slides/slide8.xml><?xml version="1.0" encoding="utf-8"?>
+<p:sld xmlns:a="http://schemas.openxmlformats.org/drawingml/2006/main" xmlns:r="http://schemas.openxmlformats.org/officeDocument/2006/relationships" xmlns:p="http://schemas.openxmlformats.org/presentationml/2006/main">
+  <p:cSld>
+    <p:bg>
+      <p:bgPr>
+        <a:gradFill>
+          <a:gsLst>
+            <a:gs pos="24000">
+              <a:schemeClr val="accent1">
+                <a:lumMod val="5000"/>
+                <a:lumOff val="95000"/>
+              </a:schemeClr>
+            </a:gs>
+            <a:gs pos="72000">
+              <a:schemeClr val="accent1">
+                <a:lumMod val="45000"/>
+                <a:lumOff val="55000"/>
+              </a:schemeClr>
+            </a:gs>
+            <a:gs pos="83000">
+              <a:schemeClr val="accent1">
+                <a:lumMod val="45000"/>
+                <a:lumOff val="55000"/>
+              </a:schemeClr>
+            </a:gs>
+            <a:gs pos="100000">
+              <a:schemeClr val="accent1">
+                <a:lumMod val="30000"/>
+                <a:lumOff val="70000"/>
+              </a:schemeClr>
+            </a:gs>
+          </a:gsLst>
+          <a:lin ang="5400000" scaled="1"/>
+        </a:gradFill>
+        <a:effectLst/>
+      </p:bgPr>
+    </p:bg>
+    <p:spTree>
+      <p:nvGrpSpPr>
+        <p:cNvPr id="1" name=""/>
+        <p:cNvGrpSpPr/>
+        <p:nvPr/>
+      </p:nvGrpSpPr>
+      <p:grpSpPr>
+        <a:xfrm>
+          <a:off x="0" y="0"/>
+          <a:ext cx="0" cy="0"/>
+          <a:chOff x="0" y="0"/>
+          <a:chExt cx="0" cy="0"/>
+        </a:xfrm>
+      </p:grpSpPr>
+      <p:sp>
+        <p:nvSpPr>
           <p:cNvPr id="41" name="TextShape 1"/>
           <p:cNvSpPr txBox="1"/>
           <p:nvPr/>
@@ -5139,7 +5720,7 @@
         </p:nvSpPr>
         <p:spPr>
           <a:xfrm>
-            <a:off x="1461780" y="2443095"/>
+            <a:off x="1399680" y="2306529"/>
             <a:ext cx="9267840" cy="2617560"/>
           </a:xfrm>
           <a:prstGeom prst="rect">
@@ -5347,6 +5928,40 @@
 <file path=ppt/slides/slide9.xml><?xml version="1.0" encoding="utf-8"?>
 <p:sld xmlns:a="http://schemas.openxmlformats.org/drawingml/2006/main" xmlns:r="http://schemas.openxmlformats.org/officeDocument/2006/relationships" xmlns:p="http://schemas.openxmlformats.org/presentationml/2006/main">
   <p:cSld>
+    <p:bg>
+      <p:bgPr>
+        <a:gradFill>
+          <a:gsLst>
+            <a:gs pos="24000">
+              <a:schemeClr val="accent1">
+                <a:lumMod val="5000"/>
+                <a:lumOff val="95000"/>
+              </a:schemeClr>
+            </a:gs>
+            <a:gs pos="72000">
+              <a:schemeClr val="accent1">
+                <a:lumMod val="45000"/>
+                <a:lumOff val="55000"/>
+              </a:schemeClr>
+            </a:gs>
+            <a:gs pos="83000">
+              <a:schemeClr val="accent1">
+                <a:lumMod val="45000"/>
+                <a:lumOff val="55000"/>
+              </a:schemeClr>
+            </a:gs>
+            <a:gs pos="100000">
+              <a:schemeClr val="accent1">
+                <a:lumMod val="30000"/>
+                <a:lumOff val="70000"/>
+              </a:schemeClr>
+            </a:gs>
+          </a:gsLst>
+          <a:lin ang="5400000" scaled="1"/>
+        </a:gradFill>
+        <a:effectLst/>
+      </p:bgPr>
+    </p:bg>
     <p:spTree>
       <p:nvGrpSpPr>
         <p:cNvPr id="1" name=""/>

</xml_diff>